<commit_message>
update prezky a eap
</commit_message>
<xml_diff>
--- a/WoodMasterPrezentacia.pptx
+++ b/WoodMasterPrezentacia.pptx
@@ -8701,7 +8701,7 @@
               <a:rPr lang="sk-SK" sz="4800" dirty="0">
                 <a:latin typeface="Trebuchet MS" panose="020B0603020202020204" pitchFamily="34" charset="0"/>
               </a:rPr>
-              <a:t> diagram – Pridávanie údajov</a:t>
+              <a:t> diagram – Priradenie práce</a:t>
             </a:r>
           </a:p>
         </p:txBody>
@@ -8759,12 +8759,42 @@
           </a:prstGeom>
         </p:spPr>
       </p:pic>
+      <p:sp>
+        <p:nvSpPr>
+          <p:cNvPr id="6" name="Zástupný objekt pre číslo snímky 5">
+            <a:extLst>
+              <a:ext uri="{FF2B5EF4-FFF2-40B4-BE49-F238E27FC236}">
+                <a16:creationId xmlns:a16="http://schemas.microsoft.com/office/drawing/2014/main" id="{8D2F3B83-0677-49DE-B709-61DD15E80477}"/>
+              </a:ext>
+            </a:extLst>
+          </p:cNvPr>
+          <p:cNvSpPr>
+            <a:spLocks noGrp="1"/>
+          </p:cNvSpPr>
+          <p:nvPr>
+            <p:ph type="sldNum" sz="quarter" idx="12"/>
+          </p:nvPr>
+        </p:nvSpPr>
+        <p:spPr/>
+        <p:txBody>
+          <a:bodyPr/>
+          <a:lstStyle/>
+          <a:p>
+            <a:fld id="{D57F1E4F-1CFF-5643-939E-217C01CDF565}" type="slidenum">
+              <a:rPr lang="en-US" smtClean="0"/>
+              <a:pPr/>
+              <a:t>12</a:t>
+            </a:fld>
+            <a:endParaRPr lang="en-US" dirty="0"/>
+          </a:p>
+        </p:txBody>
+      </p:sp>
       <p:pic>
         <p:nvPicPr>
-          <p:cNvPr id="5" name="Obrázok 4">
+          <p:cNvPr id="7" name="Obrázok 6">
             <a:extLst>
               <a:ext uri="{FF2B5EF4-FFF2-40B4-BE49-F238E27FC236}">
-                <a16:creationId xmlns:a16="http://schemas.microsoft.com/office/drawing/2014/main" id="{0C38EBE8-6584-4410-AF76-7E5F6E1E2CCB}"/>
+                <a16:creationId xmlns:a16="http://schemas.microsoft.com/office/drawing/2014/main" id="{2319BED6-D6CC-4B1D-894E-04E2868E53DF}"/>
               </a:ext>
             </a:extLst>
           </p:cNvPr>
@@ -8781,44 +8811,14 @@
         </p:blipFill>
         <p:spPr>
           <a:xfrm>
-            <a:off x="3300941" y="1600268"/>
-            <a:ext cx="5590117" cy="5257732"/>
+            <a:off x="3243262" y="1562100"/>
+            <a:ext cx="5705475" cy="5295900"/>
           </a:xfrm>
           <a:prstGeom prst="rect">
             <a:avLst/>
           </a:prstGeom>
         </p:spPr>
       </p:pic>
-      <p:sp>
-        <p:nvSpPr>
-          <p:cNvPr id="6" name="Zástupný objekt pre číslo snímky 5">
-            <a:extLst>
-              <a:ext uri="{FF2B5EF4-FFF2-40B4-BE49-F238E27FC236}">
-                <a16:creationId xmlns:a16="http://schemas.microsoft.com/office/drawing/2014/main" id="{8D2F3B83-0677-49DE-B709-61DD15E80477}"/>
-              </a:ext>
-            </a:extLst>
-          </p:cNvPr>
-          <p:cNvSpPr>
-            <a:spLocks noGrp="1"/>
-          </p:cNvSpPr>
-          <p:nvPr>
-            <p:ph type="sldNum" sz="quarter" idx="12"/>
-          </p:nvPr>
-        </p:nvSpPr>
-        <p:spPr/>
-        <p:txBody>
-          <a:bodyPr/>
-          <a:lstStyle/>
-          <a:p>
-            <a:fld id="{D57F1E4F-1CFF-5643-939E-217C01CDF565}" type="slidenum">
-              <a:rPr lang="en-US" smtClean="0"/>
-              <a:pPr/>
-              <a:t>12</a:t>
-            </a:fld>
-            <a:endParaRPr lang="en-US" dirty="0"/>
-          </a:p>
-        </p:txBody>
-      </p:sp>
     </p:spTree>
     <p:extLst>
       <p:ext uri="{BB962C8B-B14F-4D97-AF65-F5344CB8AC3E}">
@@ -11992,7 +11992,7 @@
         </p:nvSpPr>
         <p:spPr>
           <a:xfrm>
-            <a:off x="2008038" y="574683"/>
+            <a:off x="1640155" y="642932"/>
             <a:ext cx="8911687" cy="1280890"/>
           </a:xfrm>
         </p:spPr>
@@ -12006,7 +12006,7 @@
               <a:rPr lang="sk-SK" sz="4800" dirty="0">
                 <a:latin typeface="Trebuchet MS" panose="020B0603020202020204" pitchFamily="34" charset="0"/>
               </a:rPr>
-              <a:t>Biznis model – výber techniky</a:t>
+              <a:t>Biznis model – priradenie práce</a:t>
             </a:r>
           </a:p>
         </p:txBody>

</xml_diff>